<commit_message>
WRI 07, 06, 05
</commit_message>
<xml_diff>
--- a/training-cards/agile moves/Writing (WRI)/ger/apprentice/ger_wri_02_schreiben_beginnt_mit_idee_AM_A.pptx
+++ b/training-cards/agile moves/Writing (WRI)/ger/apprentice/ger_wri_02_schreiben_beginnt_mit_idee_AM_A.pptx
@@ -107,7 +107,7 @@
   </p:defaultTextStyle>
   <p:extLst>
     <p:ext uri="{EFAFB233-063F-42B5-8137-9DF3F51BA10A}">
-      <p15:sldGuideLst xmlns="" xmlns:p15="http://schemas.microsoft.com/office/powerpoint/2012/main">
+      <p15:sldGuideLst xmlns:p15="http://schemas.microsoft.com/office/powerpoint/2012/main" xmlns="">
         <p15:guide id="1" orient="horz" pos="1103">
           <p15:clr>
             <a:srgbClr val="A4A3A4"/>
@@ -582,7 +582,7 @@
                 <a:latin typeface="Avenir Light"/>
                 <a:cs typeface="Avenir Light"/>
               </a:rPr>
-              <a:t>25.10.15</a:t>
+              <a:t>02.11.15</a:t>
             </a:fld>
             <a:endParaRPr lang="de-DE" sz="600" dirty="0">
               <a:solidFill>
@@ -900,7 +900,7 @@
           <a:p>
             <a:fld id="{FF5B2BAF-DF38-0A48-A798-0C06E514FD52}" type="datetimeFigureOut">
               <a:rPr lang="de-DE" smtClean="0"/>
-              <a:t>25.10.15</a:t>
+              <a:t>02.11.15</a:t>
             </a:fld>
             <a:endParaRPr lang="de-DE" dirty="0"/>
           </a:p>
@@ -1764,7 +1764,39 @@
             </a:pPr>
             <a:r>
               <a:rPr lang="de-DE" sz="1200" dirty="0" smtClean="0"/>
-              <a:t>Was habe ich für Textideen im Kopf, die es aus meiner Sicht wert wären, aufzuschreiben? Welche Texte würde ich gerne lesen und sollten deshalb geschrieben werden?</a:t>
+              <a:t>Was </a:t>
+            </a:r>
+            <a:r>
+              <a:rPr lang="de-DE" sz="1200" dirty="0" smtClean="0"/>
+              <a:t>hast Du für </a:t>
+            </a:r>
+            <a:r>
+              <a:rPr lang="de-DE" sz="1200" dirty="0" smtClean="0"/>
+              <a:t>Textideen im Kopf, die es aus </a:t>
+            </a:r>
+            <a:r>
+              <a:rPr lang="de-DE" sz="1200" dirty="0" smtClean="0"/>
+              <a:t>Deiner </a:t>
+            </a:r>
+            <a:r>
+              <a:rPr lang="de-DE" sz="1200" dirty="0" smtClean="0"/>
+              <a:t>Sicht wert wären, aufzuschreiben? Welche Texte </a:t>
+            </a:r>
+            <a:r>
+              <a:rPr lang="de-DE" sz="1200" dirty="0" smtClean="0"/>
+              <a:t>würdest </a:t>
+            </a:r>
+            <a:r>
+              <a:rPr lang="de-DE" sz="1200" dirty="0" smtClean="0"/>
+              <a:t>Du </a:t>
+            </a:r>
+            <a:r>
+              <a:rPr lang="de-DE" sz="1200" dirty="0" smtClean="0"/>
+              <a:t>gerne </a:t>
+            </a:r>
+            <a:r>
+              <a:rPr lang="de-DE" sz="1200" dirty="0" smtClean="0"/>
+              <a:t>lesen und sollten deshalb geschrieben werden?</a:t>
             </a:r>
           </a:p>
           <a:p>
@@ -1777,8 +1809,40 @@
               </a:spcBef>
             </a:pPr>
             <a:r>
-              <a:rPr lang="de-DE" sz="1200" dirty="0" smtClean="0"/>
-              <a:t>Meinen Ideen für Texte Platz zu geben, gibt mir selbst einen größeren Platz in meinem Leben und in meinem Team.</a:t>
+              <a:rPr lang="de-DE" sz="1200" dirty="0"/>
+              <a:t>D</a:t>
+            </a:r>
+            <a:r>
+              <a:rPr lang="de-DE" sz="1200" dirty="0" smtClean="0"/>
+              <a:t>einen </a:t>
+            </a:r>
+            <a:r>
+              <a:rPr lang="de-DE" sz="1200" dirty="0" smtClean="0"/>
+              <a:t>Ideen für Texte Platz zu geben, gibt </a:t>
+            </a:r>
+            <a:r>
+              <a:rPr lang="de-DE" sz="1200" dirty="0" smtClean="0"/>
+              <a:t>Dir </a:t>
+            </a:r>
+            <a:r>
+              <a:rPr lang="de-DE" sz="1200" dirty="0" smtClean="0"/>
+              <a:t>selbst einen größeren Platz in </a:t>
+            </a:r>
+            <a:r>
+              <a:rPr lang="de-DE" sz="1200" dirty="0" smtClean="0"/>
+              <a:t>Deinem </a:t>
+            </a:r>
+            <a:r>
+              <a:rPr lang="de-DE" sz="1200" dirty="0" smtClean="0"/>
+              <a:t>Leben und in </a:t>
+            </a:r>
+            <a:r>
+              <a:rPr lang="de-DE" sz="1200" dirty="0" smtClean="0"/>
+              <a:t>Deinem </a:t>
+            </a:r>
+            <a:r>
+              <a:rPr lang="de-DE" sz="1200" dirty="0" smtClean="0"/>
+              <a:t>Team.</a:t>
             </a:r>
           </a:p>
           <a:p>
@@ -1800,7 +1864,23 @@
             </a:r>
             <a:r>
               <a:rPr lang="de-DE" sz="1200" dirty="0" smtClean="0"/>
-              <a:t> mit all meinen Ideen für Texte zu erstellen, so, wie sie mir einfallen.</a:t>
+              <a:t> mit all </a:t>
+            </a:r>
+            <a:r>
+              <a:rPr lang="de-DE" sz="1200" dirty="0" smtClean="0"/>
+              <a:t>Deinen </a:t>
+            </a:r>
+            <a:r>
+              <a:rPr lang="de-DE" sz="1200" dirty="0" smtClean="0"/>
+              <a:t>Ideen für Texte zu erstellen, so, wie sie </a:t>
+            </a:r>
+            <a:r>
+              <a:rPr lang="de-DE" sz="1200" dirty="0" smtClean="0"/>
+              <a:t>Dir </a:t>
+            </a:r>
+            <a:r>
+              <a:rPr lang="de-DE" sz="1200" dirty="0" smtClean="0"/>
+              <a:t>einfallen.</a:t>
             </a:r>
             <a:endParaRPr lang="de-DE" sz="1200" dirty="0"/>
           </a:p>
@@ -1815,7 +1895,23 @@
             </a:pPr>
             <a:r>
               <a:rPr lang="de-DE" sz="1200" dirty="0" smtClean="0"/>
-              <a:t>Dafür brauche ich einen Ort, um meine Textideen aufzuschreiben</a:t>
+              <a:t>Dafür </a:t>
+            </a:r>
+            <a:r>
+              <a:rPr lang="de-DE" sz="1200" dirty="0" smtClean="0"/>
+              <a:t>brauchst Du einen </a:t>
+            </a:r>
+            <a:r>
+              <a:rPr lang="de-DE" sz="1200" dirty="0" smtClean="0"/>
+              <a:t>Ort, um </a:t>
+            </a:r>
+            <a:r>
+              <a:rPr lang="de-DE" sz="1200" dirty="0" smtClean="0"/>
+              <a:t>Deine </a:t>
+            </a:r>
+            <a:r>
+              <a:rPr lang="de-DE" sz="1200" dirty="0" smtClean="0"/>
+              <a:t>Textideen aufzuschreiben</a:t>
             </a:r>
             <a:r>
               <a:rPr lang="de-DE" sz="1200" dirty="0"/>
@@ -1838,7 +1934,11 @@
             </a:r>
             <a:r>
               <a:rPr lang="de-DE" sz="1200" dirty="0"/>
-              <a:t>Form ist dabei weniger wichtig, als das Ziel, einen Ideenfluss für Texte in Gang zu setzen</a:t>
+              <a:t>Form ist dabei weniger wichtig, als das Ziel, einen Ideenfluss für Texte in Gang zu </a:t>
+            </a:r>
+            <a:r>
+              <a:rPr lang="de-DE" sz="1200" dirty="0" smtClean="0"/>
+              <a:t>setzen.</a:t>
             </a:r>
             <a:endParaRPr lang="de-DE" sz="1200" dirty="0" smtClean="0"/>
           </a:p>
@@ -1853,7 +1953,23 @@
             </a:pPr>
             <a:r>
               <a:rPr lang="de-DE" sz="1200" dirty="0" smtClean="0"/>
-              <a:t>Wenn ich den Schreib-Trainingsplan bearbeiten möchte, ist es sinnvoll, für das </a:t>
+              <a:t>Wenn </a:t>
+            </a:r>
+            <a:r>
+              <a:rPr lang="de-DE" sz="1200" dirty="0" smtClean="0"/>
+              <a:t>Du den </a:t>
+            </a:r>
+            <a:r>
+              <a:rPr lang="de-DE" sz="1200" dirty="0" smtClean="0"/>
+              <a:t>Schreib-Trainingsplan bearbeiten </a:t>
+            </a:r>
+            <a:r>
+              <a:rPr lang="de-DE" sz="1200" dirty="0" smtClean="0"/>
+              <a:t>möchtest, </a:t>
+            </a:r>
+            <a:r>
+              <a:rPr lang="de-DE" sz="1200" dirty="0" smtClean="0"/>
+              <a:t>ist es sinnvoll, für das </a:t>
             </a:r>
             <a:r>
               <a:rPr lang="de-DE" sz="1200" dirty="0" err="1" smtClean="0"/>
@@ -1861,7 +1977,15 @@
             </a:r>
             <a:r>
               <a:rPr lang="de-DE" sz="1200" dirty="0" smtClean="0"/>
-              <a:t> gleich zu Beginn eine Form zu wählen, in der die Ideen von mir später priorisiert und von anderen bewertet werden können. Das kann ein Blog oder ein anderes </a:t>
+              <a:t> gleich zu Beginn eine Form zu wählen, in der die Ideen von </a:t>
+            </a:r>
+            <a:r>
+              <a:rPr lang="de-DE" sz="1200" dirty="0" smtClean="0"/>
+              <a:t>Dir </a:t>
+            </a:r>
+            <a:r>
+              <a:rPr lang="de-DE" sz="1200" dirty="0" smtClean="0"/>
+              <a:t>später priorisiert und von anderen bewertet werden können. Das kann ein Blog oder ein anderes </a:t>
             </a:r>
             <a:r>
               <a:rPr lang="de-DE" sz="1200" dirty="0" err="1" smtClean="0"/>

</xml_diff>